<commit_message>
Upload final presentation ver2
</commit_message>
<xml_diff>
--- a/Final Presentation/Cryptology final Presentation.pptx
+++ b/Final Presentation/Cryptology final Presentation.pptx
@@ -9737,11 +9737,7 @@
             </a:pPr>
             <a:r>
               <a:rPr lang="en-US" altLang="zh-CN" dirty="0" smtClean="0"/>
-              <a:t>Algorithm </a:t>
-            </a:r>
-            <a:r>
-              <a:rPr lang="en-US" altLang="zh-CN" dirty="0" smtClean="0"/>
-              <a:t>implementation for SHA3 candidates.</a:t>
+              <a:t>Algorithm implementation for SHA3 candidates.</a:t>
             </a:r>
           </a:p>
           <a:p>
@@ -10101,11 +10097,7 @@
             </a:pPr>
             <a:r>
               <a:rPr lang="en-US" altLang="zh-CN" dirty="0" smtClean="0"/>
-              <a:t>Learn </a:t>
-            </a:r>
-            <a:r>
-              <a:rPr lang="en-US" altLang="zh-CN" dirty="0" smtClean="0"/>
-              <a:t>how to develop a plugin based on a project.</a:t>
+              <a:t>Learn how to develop a plugin based on a project.</a:t>
             </a:r>
           </a:p>
           <a:p>
@@ -10493,7 +10485,6 @@
               <a:rPr lang="en-US" dirty="0" smtClean="0"/>
               <a:t>Implement SHA3 candidates left.</a:t>
             </a:r>
-            <a:endParaRPr lang="en-US" dirty="0" smtClean="0"/>
           </a:p>
           <a:p>
             <a:pPr marL="342900" lvl="0" indent="-342900">
@@ -11412,11 +11403,7 @@
             </a:pPr>
             <a:r>
               <a:rPr lang="en" dirty="0" smtClean="0"/>
-              <a:t>Provide </a:t>
-            </a:r>
-            <a:r>
-              <a:rPr lang="en" dirty="0" smtClean="0"/>
-              <a:t>users with more encryption algorithms, which are candidates for SHA3 in the last round, to choose when using JCrypTool.</a:t>
+              <a:t>Provide users with more encryption algorithms, which are candidates for SHA3 in the last round, to choose when using JCrypTool.</a:t>
             </a:r>
           </a:p>
           <a:p>
@@ -11428,15 +11415,7 @@
             </a:pPr>
             <a:r>
               <a:rPr lang="en" dirty="0" smtClean="0"/>
-              <a:t>Design a better </a:t>
-            </a:r>
-            <a:r>
-              <a:rPr lang="en" dirty="0" smtClean="0"/>
-              <a:t>dialog box </a:t>
-            </a:r>
-            <a:r>
-              <a:rPr lang="en" dirty="0" smtClean="0"/>
-              <a:t>for users to choose different algorithms a</a:t>
+              <a:t>Design a better dialog box for users to choose different algorithms a</a:t>
             </a:r>
             <a:r>
               <a:rPr lang="en-US" dirty="0" err="1" smtClean="0"/>
@@ -11948,11 +11927,7 @@
             </a:pPr>
             <a:r>
               <a:rPr lang="en" dirty="0" smtClean="0"/>
-              <a:t>Problem with </a:t>
-            </a:r>
-            <a:r>
-              <a:rPr lang="en" dirty="0" smtClean="0"/>
-              <a:t>Algorithms</a:t>
+              <a:t>Problem with Algorithms</a:t>
             </a:r>
             <a:endParaRPr lang="en" dirty="0"/>
           </a:p>
@@ -12013,13 +11988,8 @@
             </a:pPr>
             <a:r>
               <a:rPr lang="en" dirty="0" smtClean="0"/>
-              <a:t>Test case(for </a:t>
+              <a:t>Test case(for Groestl):</a:t>
             </a:r>
-            <a:r>
-              <a:rPr lang="en" dirty="0" smtClean="0"/>
-              <a:t>Groestl):</a:t>
-            </a:r>
-            <a:endParaRPr lang="en" dirty="0" smtClean="0"/>
           </a:p>
           <a:p>
             <a:pPr marL="342900" lvl="0" indent="-342900">
@@ -12088,25 +12058,8 @@
             </a:pPr>
             <a:r>
               <a:rPr lang="en" dirty="0" smtClean="0"/>
-              <a:t>Problem 2: Unless </a:t>
+              <a:t>Problem 2: Unless we change the length of the input, the output will be the same for most cases.</a:t>
             </a:r>
-            <a:r>
-              <a:rPr lang="en" dirty="0" smtClean="0"/>
-              <a:t>we change </a:t>
-            </a:r>
-            <a:r>
-              <a:rPr lang="en" dirty="0" smtClean="0"/>
-              <a:t>the length of the input, </a:t>
-            </a:r>
-            <a:r>
-              <a:rPr lang="en" dirty="0" smtClean="0"/>
-              <a:t>the output will be the </a:t>
-            </a:r>
-            <a:r>
-              <a:rPr lang="en" dirty="0" smtClean="0"/>
-              <a:t>same for most cases.</a:t>
-            </a:r>
-            <a:endParaRPr lang="en" dirty="0" smtClean="0"/>
           </a:p>
           <a:p>
             <a:pPr lvl="0">
@@ -12154,7 +12107,6 @@
               <a:rPr lang="en-US" dirty="0"/>
               <a:t>: EDFF182DB0D66874D155CA79CD37FF3F625C822B37AE66E3C1903D50AB5C6C3A</a:t>
             </a:r>
-            <a:endParaRPr lang="en-US" dirty="0"/>
           </a:p>
         </p:txBody>
       </p:sp>
@@ -12792,7 +12744,11 @@
           <a:p>
             <a:r>
               <a:rPr lang="en-US" altLang="zh-CN" dirty="0" smtClean="0"/>
-              <a:t>Also add alert when input the wrong type of data.</a:t>
+              <a:t>Also </a:t>
+            </a:r>
+            <a:r>
+              <a:rPr lang="en-US" altLang="zh-CN" dirty="0" smtClean="0"/>
+              <a:t>add alert when input illegal data.</a:t>
             </a:r>
             <a:endParaRPr lang="zh-CN" altLang="en-US" dirty="0"/>
           </a:p>
@@ -12822,6 +12778,36 @@
           <a:xfrm>
             <a:off x="1490870" y="1816424"/>
             <a:ext cx="6162260" cy="3466271"/>
+          </a:xfrm>
+          <a:prstGeom prst="rect">
+            <a:avLst/>
+          </a:prstGeom>
+        </p:spPr>
+      </p:pic>
+      <p:pic>
+        <p:nvPicPr>
+          <p:cNvPr id="2" name="Picture 1"/>
+          <p:cNvPicPr>
+            <a:picLocks noChangeAspect="1"/>
+          </p:cNvPicPr>
+          <p:nvPr/>
+        </p:nvPicPr>
+        <p:blipFill>
+          <a:blip r:embed="rId3">
+            <a:extLst>
+              <a:ext uri="{28A0092B-C50C-407E-A947-70E740481C1C}">
+                <a14:useLocalDpi xmlns:a14="http://schemas.microsoft.com/office/drawing/2010/main" val="0"/>
+              </a:ext>
+            </a:extLst>
+          </a:blip>
+          <a:stretch>
+            <a:fillRect/>
+          </a:stretch>
+        </p:blipFill>
+        <p:spPr>
+          <a:xfrm>
+            <a:off x="1490870" y="1816424"/>
+            <a:ext cx="6162259" cy="3466271"/>
           </a:xfrm>
           <a:prstGeom prst="rect">
             <a:avLst/>
@@ -13093,6 +13079,121 @@
                                         </p:cTn>
                                         <p:tgtEl>
                                           <p:spTgt spid="8"/>
+                                        </p:tgtEl>
+                                        <p:attrNameLst>
+                                          <p:attrName>style.visibility</p:attrName>
+                                        </p:attrNameLst>
+                                      </p:cBhvr>
+                                      <p:to>
+                                        <p:strVal val="hidden"/>
+                                      </p:to>
+                                    </p:set>
+                                  </p:childTnLst>
+                                </p:cTn>
+                              </p:par>
+                            </p:childTnLst>
+                          </p:cTn>
+                        </p:par>
+                      </p:childTnLst>
+                    </p:cTn>
+                  </p:par>
+                  <p:par>
+                    <p:cTn id="24" fill="hold">
+                      <p:stCondLst>
+                        <p:cond delay="indefinite"/>
+                      </p:stCondLst>
+                      <p:childTnLst>
+                        <p:par>
+                          <p:cTn id="25" fill="hold">
+                            <p:stCondLst>
+                              <p:cond delay="0"/>
+                            </p:stCondLst>
+                            <p:childTnLst>
+                              <p:par>
+                                <p:cTn id="26" presetID="10" presetClass="entr" presetSubtype="0" fill="hold" nodeType="clickEffect">
+                                  <p:stCondLst>
+                                    <p:cond delay="0"/>
+                                  </p:stCondLst>
+                                  <p:childTnLst>
+                                    <p:set>
+                                      <p:cBhvr>
+                                        <p:cTn id="27" dur="1" fill="hold">
+                                          <p:stCondLst>
+                                            <p:cond delay="0"/>
+                                          </p:stCondLst>
+                                        </p:cTn>
+                                        <p:tgtEl>
+                                          <p:spTgt spid="2"/>
+                                        </p:tgtEl>
+                                        <p:attrNameLst>
+                                          <p:attrName>style.visibility</p:attrName>
+                                        </p:attrNameLst>
+                                      </p:cBhvr>
+                                      <p:to>
+                                        <p:strVal val="visible"/>
+                                      </p:to>
+                                    </p:set>
+                                    <p:animEffect transition="in" filter="fade">
+                                      <p:cBhvr>
+                                        <p:cTn id="28" dur="500"/>
+                                        <p:tgtEl>
+                                          <p:spTgt spid="2"/>
+                                        </p:tgtEl>
+                                      </p:cBhvr>
+                                    </p:animEffect>
+                                  </p:childTnLst>
+                                </p:cTn>
+                              </p:par>
+                              <p:par>
+                                <p:cTn id="29" presetID="1" presetClass="exit" presetSubtype="0" fill="hold" nodeType="withEffect">
+                                  <p:stCondLst>
+                                    <p:cond delay="0"/>
+                                  </p:stCondLst>
+                                  <p:childTnLst>
+                                    <p:set>
+                                      <p:cBhvr>
+                                        <p:cTn id="30" dur="1" fill="hold">
+                                          <p:stCondLst>
+                                            <p:cond delay="0"/>
+                                          </p:stCondLst>
+                                        </p:cTn>
+                                        <p:tgtEl>
+                                          <p:spTgt spid="6">
+                                            <p:txEl>
+                                              <p:pRg st="2" end="2"/>
+                                            </p:txEl>
+                                          </p:spTgt>
+                                        </p:tgtEl>
+                                        <p:attrNameLst>
+                                          <p:attrName>style.visibility</p:attrName>
+                                        </p:attrNameLst>
+                                      </p:cBhvr>
+                                      <p:to>
+                                        <p:strVal val="hidden"/>
+                                      </p:to>
+                                    </p:set>
+                                  </p:childTnLst>
+                                </p:cTn>
+                              </p:par>
+                              <p:par>
+                                <p:cTn id="31" presetID="1" presetClass="exit" presetSubtype="0" fill="hold" nodeType="withEffect">
+                                  <p:stCondLst>
+                                    <p:cond delay="0"/>
+                                  </p:stCondLst>
+                                  <p:childTnLst>
+                                    <p:set>
+                                      <p:cBhvr>
+                                        <p:cTn id="32" dur="1" fill="hold">
+                                          <p:stCondLst>
+                                            <p:cond delay="0"/>
+                                          </p:stCondLst>
+                                        </p:cTn>
+                                        <p:tgtEl>
+                                          <p:spTgt spid="6">
+                                            <p:txEl>
+                                              <p:pRg st="3" end="3"/>
+                                            </p:txEl>
+                                          </p:spTgt>
                                         </p:tgtEl>
                                         <p:attrNameLst>
                                           <p:attrName>style.visibility</p:attrName>

</xml_diff>

<commit_message>
Upload Final Presentation ver3
</commit_message>
<xml_diff>
--- a/Final Presentation/Cryptology final Presentation.pptx
+++ b/Final Presentation/Cryptology final Presentation.pptx
@@ -5,16 +5,16 @@
     <p:sldMasterId id="2147483659" r:id="rId1"/>
   </p:sldMasterIdLst>
   <p:notesMasterIdLst>
-    <p:notesMasterId r:id="rId17"/>
+    <p:notesMasterId r:id="rId18"/>
   </p:notesMasterIdLst>
   <p:sldIdLst>
     <p:sldId id="263" r:id="rId2"/>
     <p:sldId id="265" r:id="rId3"/>
     <p:sldId id="257" r:id="rId4"/>
     <p:sldId id="258" r:id="rId5"/>
-    <p:sldId id="264" r:id="rId6"/>
-    <p:sldId id="269" r:id="rId7"/>
-    <p:sldId id="268" r:id="rId8"/>
+    <p:sldId id="274" r:id="rId6"/>
+    <p:sldId id="264" r:id="rId7"/>
+    <p:sldId id="269" r:id="rId8"/>
     <p:sldId id="270" r:id="rId9"/>
     <p:sldId id="271" r:id="rId10"/>
     <p:sldId id="272" r:id="rId11"/>
@@ -22,7 +22,8 @@
     <p:sldId id="266" r:id="rId13"/>
     <p:sldId id="267" r:id="rId14"/>
     <p:sldId id="260" r:id="rId15"/>
-    <p:sldId id="262" r:id="rId16"/>
+    <p:sldId id="268" r:id="rId16"/>
+    <p:sldId id="262" r:id="rId17"/>
   </p:sldIdLst>
   <p:sldSz cx="9144000" cy="5143500" type="screen16x9"/>
   <p:notesSz cx="6858000" cy="9144000"/>
@@ -9755,7 +9756,11 @@
             </a:pPr>
             <a:r>
               <a:rPr lang="en-US" altLang="zh-CN" dirty="0" smtClean="0"/>
-              <a:t>Visualized the Blake algorithm.</a:t>
+              <a:t>Visualize </a:t>
+            </a:r>
+            <a:r>
+              <a:rPr lang="en-US" altLang="zh-CN" dirty="0" smtClean="0"/>
+              <a:t>the Blake algorithm.</a:t>
             </a:r>
             <a:endParaRPr lang="zh-CN" altLang="en-US" dirty="0"/>
           </a:p>
@@ -10471,9 +10476,6 @@
           <a:lstStyle/>
           <a:p>
             <a:pPr marL="342900" lvl="0" indent="-342900">
-              <a:spcBef>
-                <a:spcPts val="0"/>
-              </a:spcBef>
               <a:buClr>
                 <a:schemeClr val="dk1"/>
               </a:buClr>
@@ -10482,22 +10484,12 @@
               <a:buAutoNum type="arabicPeriod"/>
             </a:pPr>
             <a:r>
-              <a:rPr lang="en-US" dirty="0" smtClean="0"/>
-              <a:t>Implement SHA3 candidates left.</a:t>
+              <a:rPr lang="en-US" altLang="zh-CN" dirty="0" smtClean="0"/>
+              <a:t>Build </a:t>
             </a:r>
-          </a:p>
-          <a:p>
-            <a:pPr marL="342900" lvl="0" indent="-342900">
-              <a:buClr>
-                <a:schemeClr val="dk1"/>
-              </a:buClr>
-              <a:buSzPct val="61111"/>
-              <a:buFont typeface="Arial"/>
-              <a:buAutoNum type="arabicPeriod"/>
-            </a:pPr>
             <a:r>
-              <a:rPr lang="en-US" altLang="zh-CN" smtClean="0"/>
-              <a:t>Build more </a:t>
+              <a:rPr lang="en-US" altLang="zh-CN" dirty="0" smtClean="0"/>
+              <a:t>more </a:t>
             </a:r>
             <a:r>
               <a:rPr lang="en-US" altLang="zh-CN" dirty="0"/>
@@ -10519,7 +10511,15 @@
             </a:r>
             <a:r>
               <a:rPr lang="en-US" altLang="zh-CN" dirty="0"/>
-              <a:t>the visualization by import the package other than have a copy for the </a:t>
+              <a:t>the visualization by import the package other than have a </a:t>
+            </a:r>
+            <a:r>
+              <a:rPr lang="en-US" altLang="zh-CN" dirty="0" smtClean="0"/>
+              <a:t>copy </a:t>
+            </a:r>
+            <a:r>
+              <a:rPr lang="en-US" altLang="zh-CN" dirty="0"/>
+              <a:t>for the </a:t>
             </a:r>
             <a:r>
               <a:rPr lang="en-US" altLang="zh-CN" dirty="0" smtClean="0"/>
@@ -10811,31 +10811,174 @@
                             </p:childTnLst>
                           </p:cTn>
                         </p:par>
+                      </p:childTnLst>
+                    </p:cTn>
+                  </p:par>
+                </p:childTnLst>
+              </p:cTn>
+              <p:prevCondLst>
+                <p:cond evt="onPrev" delay="0">
+                  <p:tgtEl>
+                    <p:sldTgt/>
+                  </p:tgtEl>
+                </p:cond>
+              </p:prevCondLst>
+              <p:nextCondLst>
+                <p:cond evt="onNext" delay="0">
+                  <p:tgtEl>
+                    <p:sldTgt/>
+                  </p:tgtEl>
+                </p:cond>
+              </p:nextCondLst>
+            </p:seq>
+          </p:childTnLst>
+        </p:cTn>
+      </p:par>
+    </p:tnLst>
+    <p:bldLst>
+      <p:bldP spid="78" grpId="0"/>
+    </p:bldLst>
+  </p:timing>
+</p:sld>
+</file>
+
+<file path=ppt/slides/slide15.xml><?xml version="1.0" encoding="utf-8"?>
+<p:sld xmlns:a="http://schemas.openxmlformats.org/drawingml/2006/main" xmlns:r="http://schemas.openxmlformats.org/officeDocument/2006/relationships" xmlns:p="http://schemas.openxmlformats.org/presentationml/2006/main">
+  <p:cSld>
+    <p:spTree>
+      <p:nvGrpSpPr>
+        <p:cNvPr id="1" name=""/>
+        <p:cNvGrpSpPr/>
+        <p:nvPr/>
+      </p:nvGrpSpPr>
+      <p:grpSpPr>
+        <a:xfrm>
+          <a:off x="0" y="0"/>
+          <a:ext cx="0" cy="0"/>
+          <a:chOff x="0" y="0"/>
+          <a:chExt cx="0" cy="0"/>
+        </a:xfrm>
+      </p:grpSpPr>
+      <p:sp>
+        <p:nvSpPr>
+          <p:cNvPr id="2" name="Title 1"/>
+          <p:cNvSpPr>
+            <a:spLocks noGrp="1"/>
+          </p:cNvSpPr>
+          <p:nvPr>
+            <p:ph type="title"/>
+          </p:nvPr>
+        </p:nvSpPr>
+        <p:spPr/>
+        <p:txBody>
+          <a:bodyPr/>
+          <a:lstStyle/>
+          <a:p>
+            <a:r>
+              <a:rPr lang="en-US" altLang="zh-CN" dirty="0" smtClean="0"/>
+              <a:t>Trello</a:t>
+            </a:r>
+            <a:endParaRPr lang="zh-CN" altLang="en-US" dirty="0"/>
+          </a:p>
+        </p:txBody>
+      </p:sp>
+      <p:sp>
+        <p:nvSpPr>
+          <p:cNvPr id="3" name="Text Placeholder 2"/>
+          <p:cNvSpPr>
+            <a:spLocks noGrp="1"/>
+          </p:cNvSpPr>
+          <p:nvPr>
+            <p:ph type="body" idx="1"/>
+          </p:nvPr>
+        </p:nvSpPr>
+        <p:spPr/>
+        <p:txBody>
+          <a:bodyPr/>
+          <a:lstStyle/>
+          <a:p>
+            <a:endParaRPr lang="zh-CN" altLang="en-US" dirty="0"/>
+          </a:p>
+        </p:txBody>
+      </p:sp>
+      <p:pic>
+        <p:nvPicPr>
+          <p:cNvPr id="6" name="Picture 5"/>
+          <p:cNvPicPr>
+            <a:picLocks noChangeAspect="1"/>
+          </p:cNvPicPr>
+          <p:nvPr/>
+        </p:nvPicPr>
+        <p:blipFill>
+          <a:blip r:embed="rId2">
+            <a:extLst>
+              <a:ext uri="{28A0092B-C50C-407E-A947-70E740481C1C}">
+                <a14:useLocalDpi xmlns:a14="http://schemas.microsoft.com/office/drawing/2010/main" val="0"/>
+              </a:ext>
+            </a:extLst>
+          </a:blip>
+          <a:stretch>
+            <a:fillRect/>
+          </a:stretch>
+        </p:blipFill>
+        <p:spPr>
+          <a:xfrm>
+            <a:off x="311700" y="1828925"/>
+            <a:ext cx="8520600" cy="1602925"/>
+          </a:xfrm>
+          <a:prstGeom prst="rect">
+            <a:avLst/>
+          </a:prstGeom>
+        </p:spPr>
+      </p:pic>
+    </p:spTree>
+    <p:extLst>
+      <p:ext uri="{BB962C8B-B14F-4D97-AF65-F5344CB8AC3E}">
+        <p14:creationId xmlns:p14="http://schemas.microsoft.com/office/powerpoint/2010/main" val="1010473042"/>
+      </p:ext>
+    </p:extLst>
+  </p:cSld>
+  <p:clrMapOvr>
+    <a:masterClrMapping/>
+  </p:clrMapOvr>
+  <p:timing>
+    <p:tnLst>
+      <p:par>
+        <p:cTn id="1" dur="indefinite" restart="never" nodeType="tmRoot">
+          <p:childTnLst>
+            <p:seq concurrent="1" nextAc="seek">
+              <p:cTn id="2" dur="indefinite" nodeType="mainSeq">
+                <p:childTnLst>
+                  <p:par>
+                    <p:cTn id="3" fill="hold">
+                      <p:stCondLst>
+                        <p:cond delay="indefinite"/>
+                        <p:cond evt="onBegin" delay="0">
+                          <p:tn val="2"/>
+                        </p:cond>
+                      </p:stCondLst>
+                      <p:childTnLst>
                         <p:par>
-                          <p:cTn id="20" fill="hold">
+                          <p:cTn id="4" fill="hold">
                             <p:stCondLst>
-                              <p:cond delay="2000"/>
+                              <p:cond delay="0"/>
                             </p:stCondLst>
                             <p:childTnLst>
                               <p:par>
-                                <p:cTn id="21" presetID="10" presetClass="entr" presetSubtype="0" fill="hold" nodeType="afterEffect">
+                                <p:cTn id="5" presetID="10" presetClass="entr" presetSubtype="0" fill="hold" grpId="0" nodeType="withEffect">
                                   <p:stCondLst>
                                     <p:cond delay="0"/>
                                   </p:stCondLst>
                                   <p:childTnLst>
                                     <p:set>
                                       <p:cBhvr>
-                                        <p:cTn id="22" dur="1" fill="hold">
+                                        <p:cTn id="6" dur="1" fill="hold">
                                           <p:stCondLst>
                                             <p:cond delay="0"/>
                                           </p:stCondLst>
                                         </p:cTn>
                                         <p:tgtEl>
-                                          <p:spTgt spid="79">
-                                            <p:txEl>
-                                              <p:pRg st="3" end="3"/>
-                                            </p:txEl>
-                                          </p:spTgt>
+                                          <p:spTgt spid="2"/>
                                         </p:tgtEl>
                                         <p:attrNameLst>
                                           <p:attrName>style.visibility</p:attrName>
@@ -10847,13 +10990,44 @@
                                     </p:set>
                                     <p:animEffect transition="in" filter="fade">
                                       <p:cBhvr>
-                                        <p:cTn id="23" dur="500"/>
+                                        <p:cTn id="7" dur="500"/>
                                         <p:tgtEl>
-                                          <p:spTgt spid="79">
-                                            <p:txEl>
-                                              <p:pRg st="3" end="3"/>
-                                            </p:txEl>
-                                          </p:spTgt>
+                                          <p:spTgt spid="2"/>
+                                        </p:tgtEl>
+                                      </p:cBhvr>
+                                    </p:animEffect>
+                                  </p:childTnLst>
+                                </p:cTn>
+                              </p:par>
+                              <p:par>
+                                <p:cTn id="8" presetID="10" presetClass="entr" presetSubtype="0" fill="hold" nodeType="withEffect">
+                                  <p:stCondLst>
+                                    <p:cond delay="0"/>
+                                  </p:stCondLst>
+                                  <p:childTnLst>
+                                    <p:set>
+                                      <p:cBhvr>
+                                        <p:cTn id="9" dur="1" fill="hold">
+                                          <p:stCondLst>
+                                            <p:cond delay="0"/>
+                                          </p:stCondLst>
+                                        </p:cTn>
+                                        <p:tgtEl>
+                                          <p:spTgt spid="6"/>
+                                        </p:tgtEl>
+                                        <p:attrNameLst>
+                                          <p:attrName>style.visibility</p:attrName>
+                                        </p:attrNameLst>
+                                      </p:cBhvr>
+                                      <p:to>
+                                        <p:strVal val="visible"/>
+                                      </p:to>
+                                    </p:set>
+                                    <p:animEffect transition="in" filter="fade">
+                                      <p:cBhvr>
+                                        <p:cTn id="10" dur="500"/>
+                                        <p:tgtEl>
+                                          <p:spTgt spid="6"/>
                                         </p:tgtEl>
                                       </p:cBhvr>
                                     </p:animEffect>
@@ -10888,13 +11062,13 @@
       </p:par>
     </p:tnLst>
     <p:bldLst>
-      <p:bldP spid="78" grpId="0"/>
+      <p:bldP spid="2" grpId="0"/>
     </p:bldLst>
   </p:timing>
 </p:sld>
 </file>
 
-<file path=ppt/slides/slide15.xml><?xml version="1.0" encoding="utf-8"?>
+<file path=ppt/slides/slide16.xml><?xml version="1.0" encoding="utf-8"?>
 <p:sld xmlns:a="http://schemas.openxmlformats.org/drawingml/2006/main" xmlns:r="http://schemas.openxmlformats.org/officeDocument/2006/relationships" xmlns:p="http://schemas.openxmlformats.org/presentationml/2006/main">
   <p:cSld>
     <p:spTree>
@@ -11403,7 +11577,19 @@
             </a:pPr>
             <a:r>
               <a:rPr lang="en" dirty="0" smtClean="0"/>
-              <a:t>Provide users with more encryption algorithms, which are candidates for SHA3 in the last round, to choose when using JCrypTool.</a:t>
+              <a:t>Provide users with </a:t>
+            </a:r>
+            <a:r>
+              <a:rPr lang="en-US" altLang="zh-CN" dirty="0" smtClean="0"/>
+              <a:t>SHA3 candidates </a:t>
+            </a:r>
+            <a:r>
+              <a:rPr lang="en" dirty="0" smtClean="0"/>
+              <a:t>to </a:t>
+            </a:r>
+            <a:r>
+              <a:rPr lang="en" dirty="0" smtClean="0"/>
+              <a:t>choose when using JCrypTool.</a:t>
             </a:r>
           </a:p>
           <a:p>
@@ -11434,8 +11620,12 @@
               <a:buAutoNum type="arabicPeriod"/>
             </a:pPr>
             <a:r>
+              <a:rPr lang="en" dirty="0" smtClean="0"/>
+              <a:t>Visualize the </a:t>
+            </a:r>
+            <a:r>
               <a:rPr lang="en" dirty="0"/>
-              <a:t>Visualized Blake algorithm.</a:t>
+              <a:t>Blake algorithm.</a:t>
             </a:r>
           </a:p>
         </p:txBody>
@@ -11886,6 +12076,167 @@
   <p:cSld>
     <p:spTree>
       <p:nvGrpSpPr>
+        <p:cNvPr id="1" name=""/>
+        <p:cNvGrpSpPr/>
+        <p:nvPr/>
+      </p:nvGrpSpPr>
+      <p:grpSpPr>
+        <a:xfrm>
+          <a:off x="0" y="0"/>
+          <a:ext cx="0" cy="0"/>
+          <a:chOff x="0" y="0"/>
+          <a:chExt cx="0" cy="0"/>
+        </a:xfrm>
+      </p:grpSpPr>
+      <p:sp>
+        <p:nvSpPr>
+          <p:cNvPr id="2" name="Title 1"/>
+          <p:cNvSpPr>
+            <a:spLocks noGrp="1"/>
+          </p:cNvSpPr>
+          <p:nvPr>
+            <p:ph type="title"/>
+          </p:nvPr>
+        </p:nvSpPr>
+        <p:spPr/>
+        <p:txBody>
+          <a:bodyPr/>
+          <a:lstStyle/>
+          <a:p>
+            <a:r>
+              <a:rPr lang="en-US" altLang="zh-CN" dirty="0" smtClean="0"/>
+              <a:t>Test Results</a:t>
+            </a:r>
+            <a:endParaRPr lang="zh-CN" altLang="en-US" dirty="0"/>
+          </a:p>
+        </p:txBody>
+      </p:sp>
+      <p:sp>
+        <p:nvSpPr>
+          <p:cNvPr id="3" name="Text Placeholder 2"/>
+          <p:cNvSpPr>
+            <a:spLocks noGrp="1"/>
+          </p:cNvSpPr>
+          <p:nvPr>
+            <p:ph type="body" idx="1"/>
+          </p:nvPr>
+        </p:nvSpPr>
+        <p:spPr/>
+        <p:txBody>
+          <a:bodyPr/>
+          <a:lstStyle/>
+          <a:p>
+            <a:endParaRPr lang="zh-CN" altLang="en-US"/>
+          </a:p>
+        </p:txBody>
+      </p:sp>
+    </p:spTree>
+    <p:extLst>
+      <p:ext uri="{BB962C8B-B14F-4D97-AF65-F5344CB8AC3E}">
+        <p14:creationId xmlns:p14="http://schemas.microsoft.com/office/powerpoint/2010/main" val="3235467017"/>
+      </p:ext>
+    </p:extLst>
+  </p:cSld>
+  <p:clrMapOvr>
+    <a:masterClrMapping/>
+  </p:clrMapOvr>
+  <p:timing>
+    <p:tnLst>
+      <p:par>
+        <p:cTn id="1" dur="indefinite" restart="never" nodeType="tmRoot">
+          <p:childTnLst>
+            <p:seq concurrent="1" nextAc="seek">
+              <p:cTn id="2" dur="indefinite" nodeType="mainSeq">
+                <p:childTnLst>
+                  <p:par>
+                    <p:cTn id="3" fill="hold">
+                      <p:stCondLst>
+                        <p:cond delay="indefinite"/>
+                        <p:cond evt="onBegin" delay="0">
+                          <p:tn val="2"/>
+                        </p:cond>
+                      </p:stCondLst>
+                      <p:childTnLst>
+                        <p:par>
+                          <p:cTn id="4" fill="hold">
+                            <p:stCondLst>
+                              <p:cond delay="0"/>
+                            </p:stCondLst>
+                            <p:childTnLst>
+                              <p:par>
+                                <p:cTn id="5" presetID="10" presetClass="entr" presetSubtype="0" fill="hold" grpId="0" nodeType="withEffect">
+                                  <p:stCondLst>
+                                    <p:cond delay="0"/>
+                                  </p:stCondLst>
+                                  <p:childTnLst>
+                                    <p:set>
+                                      <p:cBhvr>
+                                        <p:cTn id="6" dur="1" fill="hold">
+                                          <p:stCondLst>
+                                            <p:cond delay="0"/>
+                                          </p:stCondLst>
+                                        </p:cTn>
+                                        <p:tgtEl>
+                                          <p:spTgt spid="2"/>
+                                        </p:tgtEl>
+                                        <p:attrNameLst>
+                                          <p:attrName>style.visibility</p:attrName>
+                                        </p:attrNameLst>
+                                      </p:cBhvr>
+                                      <p:to>
+                                        <p:strVal val="visible"/>
+                                      </p:to>
+                                    </p:set>
+                                    <p:animEffect transition="in" filter="fade">
+                                      <p:cBhvr>
+                                        <p:cTn id="7" dur="500"/>
+                                        <p:tgtEl>
+                                          <p:spTgt spid="2"/>
+                                        </p:tgtEl>
+                                      </p:cBhvr>
+                                    </p:animEffect>
+                                  </p:childTnLst>
+                                </p:cTn>
+                              </p:par>
+                            </p:childTnLst>
+                          </p:cTn>
+                        </p:par>
+                      </p:childTnLst>
+                    </p:cTn>
+                  </p:par>
+                </p:childTnLst>
+              </p:cTn>
+              <p:prevCondLst>
+                <p:cond evt="onPrev" delay="0">
+                  <p:tgtEl>
+                    <p:sldTgt/>
+                  </p:tgtEl>
+                </p:cond>
+              </p:prevCondLst>
+              <p:nextCondLst>
+                <p:cond evt="onNext" delay="0">
+                  <p:tgtEl>
+                    <p:sldTgt/>
+                  </p:tgtEl>
+                </p:cond>
+              </p:nextCondLst>
+            </p:seq>
+          </p:childTnLst>
+        </p:cTn>
+      </p:par>
+    </p:tnLst>
+    <p:bldLst>
+      <p:bldP spid="2" grpId="0"/>
+    </p:bldLst>
+  </p:timing>
+</p:sld>
+</file>
+
+<file path=ppt/slides/slide6.xml><?xml version="1.0" encoding="utf-8"?>
+<p:sld xmlns:a="http://schemas.openxmlformats.org/drawingml/2006/main" xmlns:r="http://schemas.openxmlformats.org/officeDocument/2006/relationships" xmlns:p="http://schemas.openxmlformats.org/presentationml/2006/main">
+  <p:cSld>
+    <p:spTree>
+      <p:nvGrpSpPr>
         <p:cNvPr id="1" name="Shape 71"/>
         <p:cNvGrpSpPr/>
         <p:nvPr/>
@@ -11971,7 +12322,15 @@
             </a:pPr>
             <a:r>
               <a:rPr lang="en" dirty="0" smtClean="0"/>
-              <a:t>The algorithm doesn’t output the correct answer.</a:t>
+              <a:t>The </a:t>
+            </a:r>
+            <a:r>
+              <a:rPr lang="en" dirty="0" smtClean="0"/>
+              <a:t>algorithms didn’t </a:t>
+            </a:r>
+            <a:r>
+              <a:rPr lang="en" dirty="0" smtClean="0"/>
+              <a:t>output the correct answer.</a:t>
             </a:r>
           </a:p>
           <a:p>
@@ -12671,7 +13030,7 @@
 </p:sld>
 </file>
 
-<file path=ppt/slides/slide6.xml><?xml version="1.0" encoding="utf-8"?>
+<file path=ppt/slides/slide7.xml><?xml version="1.0" encoding="utf-8"?>
 <p:sld xmlns:a="http://schemas.openxmlformats.org/drawingml/2006/main" xmlns:r="http://schemas.openxmlformats.org/officeDocument/2006/relationships" xmlns:p="http://schemas.openxmlformats.org/presentationml/2006/main">
   <p:cSld>
     <p:spTree>
@@ -12744,11 +13103,7 @@
           <a:p>
             <a:r>
               <a:rPr lang="en-US" altLang="zh-CN" dirty="0" smtClean="0"/>
-              <a:t>Also </a:t>
-            </a:r>
-            <a:r>
-              <a:rPr lang="en-US" altLang="zh-CN" dirty="0" smtClean="0"/>
-              <a:t>add alert when input illegal data.</a:t>
+              <a:t>Also add alert when input illegal data.</a:t>
             </a:r>
             <a:endParaRPr lang="zh-CN" altLang="en-US" dirty="0"/>
           </a:p>
@@ -13236,232 +13591,6 @@
     <p:bldLst>
       <p:bldP spid="5" grpId="0"/>
       <p:bldP spid="6" grpId="0" uiExpand="1" build="p"/>
-    </p:bldLst>
-  </p:timing>
-</p:sld>
-</file>
-
-<file path=ppt/slides/slide7.xml><?xml version="1.0" encoding="utf-8"?>
-<p:sld xmlns:a="http://schemas.openxmlformats.org/drawingml/2006/main" xmlns:r="http://schemas.openxmlformats.org/officeDocument/2006/relationships" xmlns:p="http://schemas.openxmlformats.org/presentationml/2006/main">
-  <p:cSld>
-    <p:spTree>
-      <p:nvGrpSpPr>
-        <p:cNvPr id="1" name=""/>
-        <p:cNvGrpSpPr/>
-        <p:nvPr/>
-      </p:nvGrpSpPr>
-      <p:grpSpPr>
-        <a:xfrm>
-          <a:off x="0" y="0"/>
-          <a:ext cx="0" cy="0"/>
-          <a:chOff x="0" y="0"/>
-          <a:chExt cx="0" cy="0"/>
-        </a:xfrm>
-      </p:grpSpPr>
-      <p:sp>
-        <p:nvSpPr>
-          <p:cNvPr id="2" name="Title 1"/>
-          <p:cNvSpPr>
-            <a:spLocks noGrp="1"/>
-          </p:cNvSpPr>
-          <p:nvPr>
-            <p:ph type="title"/>
-          </p:nvPr>
-        </p:nvSpPr>
-        <p:spPr/>
-        <p:txBody>
-          <a:bodyPr/>
-          <a:lstStyle/>
-          <a:p>
-            <a:r>
-              <a:rPr lang="en-US" altLang="zh-CN" dirty="0" smtClean="0"/>
-              <a:t>Trello</a:t>
-            </a:r>
-            <a:endParaRPr lang="zh-CN" altLang="en-US" dirty="0"/>
-          </a:p>
-        </p:txBody>
-      </p:sp>
-      <p:sp>
-        <p:nvSpPr>
-          <p:cNvPr id="3" name="Text Placeholder 2"/>
-          <p:cNvSpPr>
-            <a:spLocks noGrp="1"/>
-          </p:cNvSpPr>
-          <p:nvPr>
-            <p:ph type="body" idx="1"/>
-          </p:nvPr>
-        </p:nvSpPr>
-        <p:spPr/>
-        <p:txBody>
-          <a:bodyPr/>
-          <a:lstStyle/>
-          <a:p>
-            <a:endParaRPr lang="zh-CN" altLang="en-US" dirty="0"/>
-          </a:p>
-        </p:txBody>
-      </p:sp>
-      <p:pic>
-        <p:nvPicPr>
-          <p:cNvPr id="4" name="Picture 3"/>
-          <p:cNvPicPr>
-            <a:picLocks noChangeAspect="1"/>
-          </p:cNvPicPr>
-          <p:nvPr/>
-        </p:nvPicPr>
-        <p:blipFill>
-          <a:blip r:embed="rId2">
-            <a:extLst>
-              <a:ext uri="{28A0092B-C50C-407E-A947-70E740481C1C}">
-                <a14:useLocalDpi xmlns:a14="http://schemas.microsoft.com/office/drawing/2010/main" val="0"/>
-              </a:ext>
-            </a:extLst>
-          </a:blip>
-          <a:stretch>
-            <a:fillRect/>
-          </a:stretch>
-        </p:blipFill>
-        <p:spPr>
-          <a:xfrm>
-            <a:off x="967408" y="955812"/>
-            <a:ext cx="7209183" cy="4055165"/>
-          </a:xfrm>
-          <a:prstGeom prst="rect">
-            <a:avLst/>
-          </a:prstGeom>
-        </p:spPr>
-      </p:pic>
-    </p:spTree>
-    <p:extLst>
-      <p:ext uri="{BB962C8B-B14F-4D97-AF65-F5344CB8AC3E}">
-        <p14:creationId xmlns:p14="http://schemas.microsoft.com/office/powerpoint/2010/main" val="1010473042"/>
-      </p:ext>
-    </p:extLst>
-  </p:cSld>
-  <p:clrMapOvr>
-    <a:masterClrMapping/>
-  </p:clrMapOvr>
-  <p:timing>
-    <p:tnLst>
-      <p:par>
-        <p:cTn id="1" dur="indefinite" restart="never" nodeType="tmRoot">
-          <p:childTnLst>
-            <p:seq concurrent="1" nextAc="seek">
-              <p:cTn id="2" dur="indefinite" nodeType="mainSeq">
-                <p:childTnLst>
-                  <p:par>
-                    <p:cTn id="3" fill="hold">
-                      <p:stCondLst>
-                        <p:cond delay="indefinite"/>
-                        <p:cond evt="onBegin" delay="0">
-                          <p:tn val="2"/>
-                        </p:cond>
-                      </p:stCondLst>
-                      <p:childTnLst>
-                        <p:par>
-                          <p:cTn id="4" fill="hold">
-                            <p:stCondLst>
-                              <p:cond delay="0"/>
-                            </p:stCondLst>
-                            <p:childTnLst>
-                              <p:par>
-                                <p:cTn id="5" presetID="10" presetClass="entr" presetSubtype="0" fill="hold" grpId="0" nodeType="withEffect">
-                                  <p:stCondLst>
-                                    <p:cond delay="0"/>
-                                  </p:stCondLst>
-                                  <p:childTnLst>
-                                    <p:set>
-                                      <p:cBhvr>
-                                        <p:cTn id="6" dur="1" fill="hold">
-                                          <p:stCondLst>
-                                            <p:cond delay="0"/>
-                                          </p:stCondLst>
-                                        </p:cTn>
-                                        <p:tgtEl>
-                                          <p:spTgt spid="2"/>
-                                        </p:tgtEl>
-                                        <p:attrNameLst>
-                                          <p:attrName>style.visibility</p:attrName>
-                                        </p:attrNameLst>
-                                      </p:cBhvr>
-                                      <p:to>
-                                        <p:strVal val="visible"/>
-                                      </p:to>
-                                    </p:set>
-                                    <p:animEffect transition="in" filter="fade">
-                                      <p:cBhvr>
-                                        <p:cTn id="7" dur="500"/>
-                                        <p:tgtEl>
-                                          <p:spTgt spid="2"/>
-                                        </p:tgtEl>
-                                      </p:cBhvr>
-                                    </p:animEffect>
-                                  </p:childTnLst>
-                                </p:cTn>
-                              </p:par>
-                              <p:par>
-                                <p:cTn id="8" presetID="10" presetClass="entr" presetSubtype="0" fill="hold" nodeType="withEffect">
-                                  <p:stCondLst>
-                                    <p:cond delay="0"/>
-                                  </p:stCondLst>
-                                  <p:childTnLst>
-                                    <p:set>
-                                      <p:cBhvr>
-                                        <p:cTn id="9" dur="1" fill="hold">
-                                          <p:stCondLst>
-                                            <p:cond delay="0"/>
-                                          </p:stCondLst>
-                                        </p:cTn>
-                                        <p:tgtEl>
-                                          <p:spTgt spid="4"/>
-                                        </p:tgtEl>
-                                        <p:attrNameLst>
-                                          <p:attrName>style.visibility</p:attrName>
-                                        </p:attrNameLst>
-                                      </p:cBhvr>
-                                      <p:to>
-                                        <p:strVal val="visible"/>
-                                      </p:to>
-                                    </p:set>
-                                    <p:animEffect transition="in" filter="fade">
-                                      <p:cBhvr>
-                                        <p:cTn id="10" dur="500"/>
-                                        <p:tgtEl>
-                                          <p:spTgt spid="4"/>
-                                        </p:tgtEl>
-                                      </p:cBhvr>
-                                    </p:animEffect>
-                                  </p:childTnLst>
-                                </p:cTn>
-                              </p:par>
-                            </p:childTnLst>
-                          </p:cTn>
-                        </p:par>
-                      </p:childTnLst>
-                    </p:cTn>
-                  </p:par>
-                </p:childTnLst>
-              </p:cTn>
-              <p:prevCondLst>
-                <p:cond evt="onPrev" delay="0">
-                  <p:tgtEl>
-                    <p:sldTgt/>
-                  </p:tgtEl>
-                </p:cond>
-              </p:prevCondLst>
-              <p:nextCondLst>
-                <p:cond evt="onNext" delay="0">
-                  <p:tgtEl>
-                    <p:sldTgt/>
-                  </p:tgtEl>
-                </p:cond>
-              </p:nextCondLst>
-            </p:seq>
-          </p:childTnLst>
-        </p:cTn>
-      </p:par>
-    </p:tnLst>
-    <p:bldLst>
-      <p:bldP spid="2" grpId="0"/>
     </p:bldLst>
   </p:timing>
 </p:sld>

</xml_diff>

<commit_message>
Upload Final Presentation final version
</commit_message>
<xml_diff>
--- a/Final Presentation/Cryptology final Presentation.pptx
+++ b/Final Presentation/Cryptology final Presentation.pptx
@@ -5,7 +5,7 @@
     <p:sldMasterId id="2147483659" r:id="rId1"/>
   </p:sldMasterIdLst>
   <p:notesMasterIdLst>
-    <p:notesMasterId r:id="rId18"/>
+    <p:notesMasterId r:id="rId20"/>
   </p:notesMasterIdLst>
   <p:sldIdLst>
     <p:sldId id="263" r:id="rId2"/>
@@ -17,13 +17,15 @@
     <p:sldId id="269" r:id="rId8"/>
     <p:sldId id="270" r:id="rId9"/>
     <p:sldId id="271" r:id="rId10"/>
-    <p:sldId id="272" r:id="rId11"/>
-    <p:sldId id="273" r:id="rId12"/>
-    <p:sldId id="266" r:id="rId13"/>
-    <p:sldId id="267" r:id="rId14"/>
-    <p:sldId id="260" r:id="rId15"/>
-    <p:sldId id="268" r:id="rId16"/>
-    <p:sldId id="262" r:id="rId17"/>
+    <p:sldId id="275" r:id="rId11"/>
+    <p:sldId id="272" r:id="rId12"/>
+    <p:sldId id="273" r:id="rId13"/>
+    <p:sldId id="276" r:id="rId14"/>
+    <p:sldId id="266" r:id="rId15"/>
+    <p:sldId id="267" r:id="rId16"/>
+    <p:sldId id="260" r:id="rId17"/>
+    <p:sldId id="268" r:id="rId18"/>
+    <p:sldId id="262" r:id="rId19"/>
   </p:sldIdLst>
   <p:sldSz cx="9144000" cy="5143500" type="screen16x9"/>
   <p:notesSz cx="6858000" cy="9144000"/>
@@ -8916,6 +8918,260 @@
       </p:grpSpPr>
       <p:sp>
         <p:nvSpPr>
+          <p:cNvPr id="3" name="Text Placeholder 2"/>
+          <p:cNvSpPr>
+            <a:spLocks noGrp="1"/>
+          </p:cNvSpPr>
+          <p:nvPr>
+            <p:ph type="body" idx="1"/>
+          </p:nvPr>
+        </p:nvSpPr>
+        <p:spPr>
+          <a:xfrm>
+            <a:off x="-1" y="0"/>
+            <a:ext cx="9402417" cy="5143500"/>
+          </a:xfrm>
+        </p:spPr>
+        <p:txBody>
+          <a:bodyPr/>
+          <a:lstStyle/>
+          <a:p>
+            <a:r>
+              <a:rPr lang="en-US" altLang="zh-CN" dirty="0" smtClean="0"/>
+              <a:t>Keccak:</a:t>
+            </a:r>
+          </a:p>
+          <a:p>
+            <a:r>
+              <a:rPr lang="en-US" altLang="zh-CN" dirty="0"/>
+              <a:t>Output1: 4A441AB0A95C5CF500363FA8753AE8E4FC5FB5E3EC54BA492F52271835BBC718</a:t>
+            </a:r>
+            <a:endParaRPr lang="en-US" altLang="zh-CN" dirty="0" smtClean="0"/>
+          </a:p>
+          <a:p>
+            <a:r>
+              <a:rPr lang="en-US" altLang="zh-CN" dirty="0"/>
+              <a:t>Output2: 0235DC28399BF9B391831E2ABDDC156D1F3A920C9FFE3C4ED1B5ABCBC9DFE1EA</a:t>
+            </a:r>
+            <a:endParaRPr lang="zh-CN" altLang="en-US" dirty="0"/>
+          </a:p>
+        </p:txBody>
+      </p:sp>
+    </p:spTree>
+    <p:extLst>
+      <p:ext uri="{BB962C8B-B14F-4D97-AF65-F5344CB8AC3E}">
+        <p14:creationId xmlns:p14="http://schemas.microsoft.com/office/powerpoint/2010/main" val="2640568744"/>
+      </p:ext>
+    </p:extLst>
+  </p:cSld>
+  <p:clrMapOvr>
+    <a:masterClrMapping/>
+  </p:clrMapOvr>
+  <p:timing>
+    <p:tnLst>
+      <p:par>
+        <p:cTn id="1" dur="indefinite" restart="never" nodeType="tmRoot">
+          <p:childTnLst>
+            <p:seq concurrent="1" nextAc="seek">
+              <p:cTn id="2" dur="indefinite" nodeType="mainSeq">
+                <p:childTnLst>
+                  <p:par>
+                    <p:cTn id="3" fill="hold">
+                      <p:stCondLst>
+                        <p:cond delay="indefinite"/>
+                        <p:cond evt="onBegin" delay="0">
+                          <p:tn val="2"/>
+                        </p:cond>
+                      </p:stCondLst>
+                      <p:childTnLst>
+                        <p:par>
+                          <p:cTn id="4" fill="hold">
+                            <p:stCondLst>
+                              <p:cond delay="0"/>
+                            </p:stCondLst>
+                            <p:childTnLst>
+                              <p:par>
+                                <p:cTn id="5" presetID="10" presetClass="entr" presetSubtype="0" fill="hold" grpId="0" nodeType="withEffect">
+                                  <p:stCondLst>
+                                    <p:cond delay="0"/>
+                                  </p:stCondLst>
+                                  <p:childTnLst>
+                                    <p:set>
+                                      <p:cBhvr>
+                                        <p:cTn id="6" dur="1" fill="hold">
+                                          <p:stCondLst>
+                                            <p:cond delay="0"/>
+                                          </p:stCondLst>
+                                        </p:cTn>
+                                        <p:tgtEl>
+                                          <p:spTgt spid="3">
+                                            <p:txEl>
+                                              <p:pRg st="0" end="0"/>
+                                            </p:txEl>
+                                          </p:spTgt>
+                                        </p:tgtEl>
+                                        <p:attrNameLst>
+                                          <p:attrName>style.visibility</p:attrName>
+                                        </p:attrNameLst>
+                                      </p:cBhvr>
+                                      <p:to>
+                                        <p:strVal val="visible"/>
+                                      </p:to>
+                                    </p:set>
+                                    <p:animEffect transition="in" filter="fade">
+                                      <p:cBhvr>
+                                        <p:cTn id="7" dur="500"/>
+                                        <p:tgtEl>
+                                          <p:spTgt spid="3">
+                                            <p:txEl>
+                                              <p:pRg st="0" end="0"/>
+                                            </p:txEl>
+                                          </p:spTgt>
+                                        </p:tgtEl>
+                                      </p:cBhvr>
+                                    </p:animEffect>
+                                  </p:childTnLst>
+                                </p:cTn>
+                              </p:par>
+                              <p:par>
+                                <p:cTn id="8" presetID="10" presetClass="entr" presetSubtype="0" fill="hold" grpId="0" nodeType="withEffect">
+                                  <p:stCondLst>
+                                    <p:cond delay="0"/>
+                                  </p:stCondLst>
+                                  <p:childTnLst>
+                                    <p:set>
+                                      <p:cBhvr>
+                                        <p:cTn id="9" dur="1" fill="hold">
+                                          <p:stCondLst>
+                                            <p:cond delay="0"/>
+                                          </p:stCondLst>
+                                        </p:cTn>
+                                        <p:tgtEl>
+                                          <p:spTgt spid="3">
+                                            <p:txEl>
+                                              <p:pRg st="1" end="1"/>
+                                            </p:txEl>
+                                          </p:spTgt>
+                                        </p:tgtEl>
+                                        <p:attrNameLst>
+                                          <p:attrName>style.visibility</p:attrName>
+                                        </p:attrNameLst>
+                                      </p:cBhvr>
+                                      <p:to>
+                                        <p:strVal val="visible"/>
+                                      </p:to>
+                                    </p:set>
+                                    <p:animEffect transition="in" filter="fade">
+                                      <p:cBhvr>
+                                        <p:cTn id="10" dur="500"/>
+                                        <p:tgtEl>
+                                          <p:spTgt spid="3">
+                                            <p:txEl>
+                                              <p:pRg st="1" end="1"/>
+                                            </p:txEl>
+                                          </p:spTgt>
+                                        </p:tgtEl>
+                                      </p:cBhvr>
+                                    </p:animEffect>
+                                  </p:childTnLst>
+                                </p:cTn>
+                              </p:par>
+                              <p:par>
+                                <p:cTn id="11" presetID="10" presetClass="entr" presetSubtype="0" fill="hold" grpId="0" nodeType="withEffect">
+                                  <p:stCondLst>
+                                    <p:cond delay="0"/>
+                                  </p:stCondLst>
+                                  <p:childTnLst>
+                                    <p:set>
+                                      <p:cBhvr>
+                                        <p:cTn id="12" dur="1" fill="hold">
+                                          <p:stCondLst>
+                                            <p:cond delay="0"/>
+                                          </p:stCondLst>
+                                        </p:cTn>
+                                        <p:tgtEl>
+                                          <p:spTgt spid="3">
+                                            <p:txEl>
+                                              <p:pRg st="2" end="2"/>
+                                            </p:txEl>
+                                          </p:spTgt>
+                                        </p:tgtEl>
+                                        <p:attrNameLst>
+                                          <p:attrName>style.visibility</p:attrName>
+                                        </p:attrNameLst>
+                                      </p:cBhvr>
+                                      <p:to>
+                                        <p:strVal val="visible"/>
+                                      </p:to>
+                                    </p:set>
+                                    <p:animEffect transition="in" filter="fade">
+                                      <p:cBhvr>
+                                        <p:cTn id="13" dur="500"/>
+                                        <p:tgtEl>
+                                          <p:spTgt spid="3">
+                                            <p:txEl>
+                                              <p:pRg st="2" end="2"/>
+                                            </p:txEl>
+                                          </p:spTgt>
+                                        </p:tgtEl>
+                                      </p:cBhvr>
+                                    </p:animEffect>
+                                  </p:childTnLst>
+                                </p:cTn>
+                              </p:par>
+                            </p:childTnLst>
+                          </p:cTn>
+                        </p:par>
+                      </p:childTnLst>
+                    </p:cTn>
+                  </p:par>
+                </p:childTnLst>
+              </p:cTn>
+              <p:prevCondLst>
+                <p:cond evt="onPrev" delay="0">
+                  <p:tgtEl>
+                    <p:sldTgt/>
+                  </p:tgtEl>
+                </p:cond>
+              </p:prevCondLst>
+              <p:nextCondLst>
+                <p:cond evt="onNext" delay="0">
+                  <p:tgtEl>
+                    <p:sldTgt/>
+                  </p:tgtEl>
+                </p:cond>
+              </p:nextCondLst>
+            </p:seq>
+          </p:childTnLst>
+        </p:cTn>
+      </p:par>
+    </p:tnLst>
+    <p:bldLst>
+      <p:bldP spid="3" grpId="0" build="p"/>
+    </p:bldLst>
+  </p:timing>
+</p:sld>
+</file>
+
+<file path=ppt/slides/slide11.xml><?xml version="1.0" encoding="utf-8"?>
+<p:sld xmlns:a="http://schemas.openxmlformats.org/drawingml/2006/main" xmlns:r="http://schemas.openxmlformats.org/officeDocument/2006/relationships" xmlns:p="http://schemas.openxmlformats.org/presentationml/2006/main">
+  <p:cSld>
+    <p:spTree>
+      <p:nvGrpSpPr>
+        <p:cNvPr id="1" name=""/>
+        <p:cNvGrpSpPr/>
+        <p:nvPr/>
+      </p:nvGrpSpPr>
+      <p:grpSpPr>
+        <a:xfrm>
+          <a:off x="0" y="0"/>
+          <a:ext cx="0" cy="0"/>
+          <a:chOff x="0" y="0"/>
+          <a:chExt cx="0" cy="0"/>
+        </a:xfrm>
+      </p:grpSpPr>
+      <p:sp>
+        <p:nvSpPr>
           <p:cNvPr id="2" name="Title 1"/>
           <p:cNvSpPr>
             <a:spLocks noGrp="1"/>
@@ -9204,7 +9460,7 @@
 </p:sld>
 </file>
 
-<file path=ppt/slides/slide11.xml><?xml version="1.0" encoding="utf-8"?>
+<file path=ppt/slides/slide12.xml><?xml version="1.0" encoding="utf-8"?>
 <p:sld xmlns:a="http://schemas.openxmlformats.org/drawingml/2006/main" xmlns:r="http://schemas.openxmlformats.org/officeDocument/2006/relationships" xmlns:p="http://schemas.openxmlformats.org/presentationml/2006/main">
   <p:cSld>
     <p:spTree>
@@ -9663,7 +9919,313 @@
 </p:sld>
 </file>
 
-<file path=ppt/slides/slide12.xml><?xml version="1.0" encoding="utf-8"?>
+<file path=ppt/slides/slide13.xml><?xml version="1.0" encoding="utf-8"?>
+<p:sld xmlns:a="http://schemas.openxmlformats.org/drawingml/2006/main" xmlns:r="http://schemas.openxmlformats.org/officeDocument/2006/relationships" xmlns:p="http://schemas.openxmlformats.org/presentationml/2006/main">
+  <p:cSld>
+    <p:spTree>
+      <p:nvGrpSpPr>
+        <p:cNvPr id="1" name=""/>
+        <p:cNvGrpSpPr/>
+        <p:nvPr/>
+      </p:nvGrpSpPr>
+      <p:grpSpPr>
+        <a:xfrm>
+          <a:off x="0" y="0"/>
+          <a:ext cx="0" cy="0"/>
+          <a:chOff x="0" y="0"/>
+          <a:chExt cx="0" cy="0"/>
+        </a:xfrm>
+      </p:grpSpPr>
+      <p:sp>
+        <p:nvSpPr>
+          <p:cNvPr id="3" name="Text Placeholder 2"/>
+          <p:cNvSpPr>
+            <a:spLocks noGrp="1"/>
+          </p:cNvSpPr>
+          <p:nvPr>
+            <p:ph type="body" idx="1"/>
+          </p:nvPr>
+        </p:nvSpPr>
+        <p:spPr>
+          <a:xfrm>
+            <a:off x="0" y="0"/>
+            <a:ext cx="9144000" cy="5143500"/>
+          </a:xfrm>
+        </p:spPr>
+        <p:txBody>
+          <a:bodyPr/>
+          <a:lstStyle/>
+          <a:p>
+            <a:r>
+              <a:rPr lang="en-US" altLang="zh-CN" dirty="0" smtClean="0"/>
+              <a:t>Keccak:</a:t>
+            </a:r>
+          </a:p>
+          <a:p>
+            <a:r>
+              <a:rPr lang="en-US" altLang="zh-CN" dirty="0"/>
+              <a:t>Output1: </a:t>
+            </a:r>
+            <a:r>
+              <a:rPr lang="en-US" altLang="zh-CN" dirty="0" smtClean="0"/>
+              <a:t>F802E85C8EB4E33BD81F2F08CA8A8D93D8F33CC69A93F7AEE9E2395FE15D6217</a:t>
+            </a:r>
+          </a:p>
+          <a:p>
+            <a:r>
+              <a:rPr lang="en-US" altLang="zh-CN" dirty="0" smtClean="0"/>
+              <a:t>Output2:</a:t>
+            </a:r>
+          </a:p>
+          <a:p>
+            <a:r>
+              <a:rPr lang="en-US" altLang="zh-CN" dirty="0"/>
+              <a:t>61FF7DD62E23B9B99273ACBEFE04E6456A4D8D2EF2E7783DF093635AA0CB43EE</a:t>
+            </a:r>
+            <a:endParaRPr lang="zh-CN" altLang="en-US" dirty="0"/>
+          </a:p>
+        </p:txBody>
+      </p:sp>
+    </p:spTree>
+    <p:extLst>
+      <p:ext uri="{BB962C8B-B14F-4D97-AF65-F5344CB8AC3E}">
+        <p14:creationId xmlns:p14="http://schemas.microsoft.com/office/powerpoint/2010/main" val="698318626"/>
+      </p:ext>
+    </p:extLst>
+  </p:cSld>
+  <p:clrMapOvr>
+    <a:masterClrMapping/>
+  </p:clrMapOvr>
+  <p:timing>
+    <p:tnLst>
+      <p:par>
+        <p:cTn id="1" dur="indefinite" restart="never" nodeType="tmRoot">
+          <p:childTnLst>
+            <p:seq concurrent="1" nextAc="seek">
+              <p:cTn id="2" dur="indefinite" nodeType="mainSeq">
+                <p:childTnLst>
+                  <p:par>
+                    <p:cTn id="3" fill="hold">
+                      <p:stCondLst>
+                        <p:cond delay="indefinite"/>
+                        <p:cond evt="onBegin" delay="0">
+                          <p:tn val="2"/>
+                        </p:cond>
+                      </p:stCondLst>
+                      <p:childTnLst>
+                        <p:par>
+                          <p:cTn id="4" fill="hold">
+                            <p:stCondLst>
+                              <p:cond delay="0"/>
+                            </p:stCondLst>
+                            <p:childTnLst>
+                              <p:par>
+                                <p:cTn id="5" presetID="10" presetClass="entr" presetSubtype="0" fill="hold" grpId="0" nodeType="withEffect">
+                                  <p:stCondLst>
+                                    <p:cond delay="0"/>
+                                  </p:stCondLst>
+                                  <p:childTnLst>
+                                    <p:set>
+                                      <p:cBhvr>
+                                        <p:cTn id="6" dur="1" fill="hold">
+                                          <p:stCondLst>
+                                            <p:cond delay="0"/>
+                                          </p:stCondLst>
+                                        </p:cTn>
+                                        <p:tgtEl>
+                                          <p:spTgt spid="3">
+                                            <p:txEl>
+                                              <p:pRg st="0" end="0"/>
+                                            </p:txEl>
+                                          </p:spTgt>
+                                        </p:tgtEl>
+                                        <p:attrNameLst>
+                                          <p:attrName>style.visibility</p:attrName>
+                                        </p:attrNameLst>
+                                      </p:cBhvr>
+                                      <p:to>
+                                        <p:strVal val="visible"/>
+                                      </p:to>
+                                    </p:set>
+                                    <p:animEffect transition="in" filter="fade">
+                                      <p:cBhvr>
+                                        <p:cTn id="7" dur="500"/>
+                                        <p:tgtEl>
+                                          <p:spTgt spid="3">
+                                            <p:txEl>
+                                              <p:pRg st="0" end="0"/>
+                                            </p:txEl>
+                                          </p:spTgt>
+                                        </p:tgtEl>
+                                      </p:cBhvr>
+                                    </p:animEffect>
+                                  </p:childTnLst>
+                                </p:cTn>
+                              </p:par>
+                              <p:par>
+                                <p:cTn id="8" presetID="10" presetClass="entr" presetSubtype="0" fill="hold" grpId="0" nodeType="withEffect">
+                                  <p:stCondLst>
+                                    <p:cond delay="0"/>
+                                  </p:stCondLst>
+                                  <p:childTnLst>
+                                    <p:set>
+                                      <p:cBhvr>
+                                        <p:cTn id="9" dur="1" fill="hold">
+                                          <p:stCondLst>
+                                            <p:cond delay="0"/>
+                                          </p:stCondLst>
+                                        </p:cTn>
+                                        <p:tgtEl>
+                                          <p:spTgt spid="3">
+                                            <p:txEl>
+                                              <p:pRg st="1" end="1"/>
+                                            </p:txEl>
+                                          </p:spTgt>
+                                        </p:tgtEl>
+                                        <p:attrNameLst>
+                                          <p:attrName>style.visibility</p:attrName>
+                                        </p:attrNameLst>
+                                      </p:cBhvr>
+                                      <p:to>
+                                        <p:strVal val="visible"/>
+                                      </p:to>
+                                    </p:set>
+                                    <p:animEffect transition="in" filter="fade">
+                                      <p:cBhvr>
+                                        <p:cTn id="10" dur="500"/>
+                                        <p:tgtEl>
+                                          <p:spTgt spid="3">
+                                            <p:txEl>
+                                              <p:pRg st="1" end="1"/>
+                                            </p:txEl>
+                                          </p:spTgt>
+                                        </p:tgtEl>
+                                      </p:cBhvr>
+                                    </p:animEffect>
+                                  </p:childTnLst>
+                                </p:cTn>
+                              </p:par>
+                              <p:par>
+                                <p:cTn id="11" presetID="10" presetClass="entr" presetSubtype="0" fill="hold" grpId="0" nodeType="withEffect">
+                                  <p:stCondLst>
+                                    <p:cond delay="0"/>
+                                  </p:stCondLst>
+                                  <p:childTnLst>
+                                    <p:set>
+                                      <p:cBhvr>
+                                        <p:cTn id="12" dur="1" fill="hold">
+                                          <p:stCondLst>
+                                            <p:cond delay="0"/>
+                                          </p:stCondLst>
+                                        </p:cTn>
+                                        <p:tgtEl>
+                                          <p:spTgt spid="3">
+                                            <p:txEl>
+                                              <p:pRg st="2" end="2"/>
+                                            </p:txEl>
+                                          </p:spTgt>
+                                        </p:tgtEl>
+                                        <p:attrNameLst>
+                                          <p:attrName>style.visibility</p:attrName>
+                                        </p:attrNameLst>
+                                      </p:cBhvr>
+                                      <p:to>
+                                        <p:strVal val="visible"/>
+                                      </p:to>
+                                    </p:set>
+                                    <p:animEffect transition="in" filter="fade">
+                                      <p:cBhvr>
+                                        <p:cTn id="13" dur="500"/>
+                                        <p:tgtEl>
+                                          <p:spTgt spid="3">
+                                            <p:txEl>
+                                              <p:pRg st="2" end="2"/>
+                                            </p:txEl>
+                                          </p:spTgt>
+                                        </p:tgtEl>
+                                      </p:cBhvr>
+                                    </p:animEffect>
+                                  </p:childTnLst>
+                                </p:cTn>
+                              </p:par>
+                              <p:par>
+                                <p:cTn id="14" presetID="10" presetClass="entr" presetSubtype="0" fill="hold" grpId="0" nodeType="withEffect">
+                                  <p:stCondLst>
+                                    <p:cond delay="0"/>
+                                  </p:stCondLst>
+                                  <p:childTnLst>
+                                    <p:set>
+                                      <p:cBhvr>
+                                        <p:cTn id="15" dur="1" fill="hold">
+                                          <p:stCondLst>
+                                            <p:cond delay="0"/>
+                                          </p:stCondLst>
+                                        </p:cTn>
+                                        <p:tgtEl>
+                                          <p:spTgt spid="3">
+                                            <p:txEl>
+                                              <p:pRg st="3" end="3"/>
+                                            </p:txEl>
+                                          </p:spTgt>
+                                        </p:tgtEl>
+                                        <p:attrNameLst>
+                                          <p:attrName>style.visibility</p:attrName>
+                                        </p:attrNameLst>
+                                      </p:cBhvr>
+                                      <p:to>
+                                        <p:strVal val="visible"/>
+                                      </p:to>
+                                    </p:set>
+                                    <p:animEffect transition="in" filter="fade">
+                                      <p:cBhvr>
+                                        <p:cTn id="16" dur="500"/>
+                                        <p:tgtEl>
+                                          <p:spTgt spid="3">
+                                            <p:txEl>
+                                              <p:pRg st="3" end="3"/>
+                                            </p:txEl>
+                                          </p:spTgt>
+                                        </p:tgtEl>
+                                      </p:cBhvr>
+                                    </p:animEffect>
+                                  </p:childTnLst>
+                                </p:cTn>
+                              </p:par>
+                            </p:childTnLst>
+                          </p:cTn>
+                        </p:par>
+                      </p:childTnLst>
+                    </p:cTn>
+                  </p:par>
+                </p:childTnLst>
+              </p:cTn>
+              <p:prevCondLst>
+                <p:cond evt="onPrev" delay="0">
+                  <p:tgtEl>
+                    <p:sldTgt/>
+                  </p:tgtEl>
+                </p:cond>
+              </p:prevCondLst>
+              <p:nextCondLst>
+                <p:cond evt="onNext" delay="0">
+                  <p:tgtEl>
+                    <p:sldTgt/>
+                  </p:tgtEl>
+                </p:cond>
+              </p:nextCondLst>
+            </p:seq>
+          </p:childTnLst>
+        </p:cTn>
+      </p:par>
+    </p:tnLst>
+    <p:bldLst>
+      <p:bldP spid="3" grpId="0" build="p"/>
+    </p:bldLst>
+  </p:timing>
+</p:sld>
+</file>
+
+<file path=ppt/slides/slide14.xml><?xml version="1.0" encoding="utf-8"?>
 <p:sld xmlns:a="http://schemas.openxmlformats.org/drawingml/2006/main" xmlns:r="http://schemas.openxmlformats.org/officeDocument/2006/relationships" xmlns:p="http://schemas.openxmlformats.org/presentationml/2006/main">
   <p:cSld>
     <p:spTree>
@@ -9756,11 +10318,7 @@
             </a:pPr>
             <a:r>
               <a:rPr lang="en-US" altLang="zh-CN" dirty="0" smtClean="0"/>
-              <a:t>Visualize </a:t>
-            </a:r>
-            <a:r>
-              <a:rPr lang="en-US" altLang="zh-CN" dirty="0" smtClean="0"/>
-              <a:t>the Blake algorithm.</a:t>
+              <a:t>Visualize the Blake algorithm.</a:t>
             </a:r>
             <a:endParaRPr lang="zh-CN" altLang="en-US" dirty="0"/>
           </a:p>
@@ -10024,7 +10582,7 @@
 </p:sld>
 </file>
 
-<file path=ppt/slides/slide13.xml><?xml version="1.0" encoding="utf-8"?>
+<file path=ppt/slides/slide15.xml><?xml version="1.0" encoding="utf-8"?>
 <p:sld xmlns:a="http://schemas.openxmlformats.org/drawingml/2006/main" xmlns:r="http://schemas.openxmlformats.org/officeDocument/2006/relationships" xmlns:p="http://schemas.openxmlformats.org/presentationml/2006/main">
   <p:cSld>
     <p:spTree>
@@ -10399,7 +10957,7 @@
 </p:sld>
 </file>
 
-<file path=ppt/slides/slide14.xml><?xml version="1.0" encoding="utf-8"?>
+<file path=ppt/slides/slide16.xml><?xml version="1.0" encoding="utf-8"?>
 <p:sld xmlns:a="http://schemas.openxmlformats.org/drawingml/2006/main" xmlns:r="http://schemas.openxmlformats.org/officeDocument/2006/relationships" xmlns:p="http://schemas.openxmlformats.org/presentationml/2006/main">
   <p:cSld>
     <p:spTree>
@@ -10485,11 +11043,7 @@
             </a:pPr>
             <a:r>
               <a:rPr lang="en-US" altLang="zh-CN" dirty="0" smtClean="0"/>
-              <a:t>Build </a:t>
-            </a:r>
-            <a:r>
-              <a:rPr lang="en-US" altLang="zh-CN" dirty="0" smtClean="0"/>
-              <a:t>more </a:t>
+              <a:t>Build more </a:t>
             </a:r>
             <a:r>
               <a:rPr lang="en-US" altLang="zh-CN" dirty="0"/>
@@ -10842,7 +11396,7 @@
 </p:sld>
 </file>
 
-<file path=ppt/slides/slide15.xml><?xml version="1.0" encoding="utf-8"?>
+<file path=ppt/slides/slide17.xml><?xml version="1.0" encoding="utf-8"?>
 <p:sld xmlns:a="http://schemas.openxmlformats.org/drawingml/2006/main" xmlns:r="http://schemas.openxmlformats.org/officeDocument/2006/relationships" xmlns:p="http://schemas.openxmlformats.org/presentationml/2006/main">
   <p:cSld>
     <p:spTree>
@@ -11068,7 +11622,7 @@
 </p:sld>
 </file>
 
-<file path=ppt/slides/slide16.xml><?xml version="1.0" encoding="utf-8"?>
+<file path=ppt/slides/slide18.xml><?xml version="1.0" encoding="utf-8"?>
 <p:sld xmlns:a="http://schemas.openxmlformats.org/drawingml/2006/main" xmlns:r="http://schemas.openxmlformats.org/officeDocument/2006/relationships" xmlns:p="http://schemas.openxmlformats.org/presentationml/2006/main">
   <p:cSld>
     <p:spTree>
@@ -11585,12 +12139,13 @@
             </a:r>
             <a:r>
               <a:rPr lang="en" dirty="0" smtClean="0"/>
-              <a:t>to </a:t>
+              <a:t>to choose when using </a:t>
             </a:r>
             <a:r>
               <a:rPr lang="en" dirty="0" smtClean="0"/>
-              <a:t>choose when using JCrypTool.</a:t>
+              <a:t>JCrypTool.</a:t>
             </a:r>
+            <a:endParaRPr lang="en" dirty="0" smtClean="0"/>
           </a:p>
           <a:p>
             <a:pPr marL="342900" lvl="0" indent="-342900">
@@ -12322,15 +12877,7 @@
             </a:pPr>
             <a:r>
               <a:rPr lang="en" dirty="0" smtClean="0"/>
-              <a:t>The </a:t>
-            </a:r>
-            <a:r>
-              <a:rPr lang="en" dirty="0" smtClean="0"/>
-              <a:t>algorithms didn’t </a:t>
-            </a:r>
-            <a:r>
-              <a:rPr lang="en" dirty="0" smtClean="0"/>
-              <a:t>output the correct answer.</a:t>
+              <a:t>The algorithms didn’t output the correct answer.</a:t>
             </a:r>
           </a:p>
           <a:p>

</xml_diff>